<commit_message>
added SVMs to Report
</commit_message>
<xml_diff>
--- a/Challenge Presentation.pptx
+++ b/Challenge Presentation.pptx
@@ -137,6 +137,70 @@
 
 <file path=ppt/changesInfos/changesInfo1.xml><?xml version="1.0" encoding="utf-8"?>
 <pc:chgInfo xmlns:a="http://schemas.openxmlformats.org/drawingml/2006/main" xmlns:r="http://schemas.openxmlformats.org/officeDocument/2006/relationships" xmlns:ac="http://schemas.microsoft.com/office/drawing/2013/main/command" xmlns:pc="http://schemas.microsoft.com/office/powerpoint/2013/main/command">
+  <pc:docChgLst>
+    <pc:chgData name="Sandro Assek" userId="c00f4fa3-2fb0-4ff2-817b-9b12cde38168" providerId="ADAL" clId="{879E222E-A6AC-41DC-AC0B-D5A2E8530FCD}"/>
+    <pc:docChg chg="custSel modSld">
+      <pc:chgData name="Sandro Assek" userId="c00f4fa3-2fb0-4ff2-817b-9b12cde38168" providerId="ADAL" clId="{879E222E-A6AC-41DC-AC0B-D5A2E8530FCD}" dt="2023-06-22T10:08:47.498" v="845" actId="20577"/>
+      <pc:docMkLst>
+        <pc:docMk/>
+      </pc:docMkLst>
+      <pc:sldChg chg="addSp delSp modSp">
+        <pc:chgData name="Sandro Assek" userId="c00f4fa3-2fb0-4ff2-817b-9b12cde38168" providerId="ADAL" clId="{879E222E-A6AC-41DC-AC0B-D5A2E8530FCD}" dt="2023-06-22T10:08:47.498" v="845" actId="20577"/>
+        <pc:sldMkLst>
+          <pc:docMk/>
+          <pc:sldMk cId="0" sldId="261"/>
+        </pc:sldMkLst>
+        <pc:spChg chg="mod">
+          <ac:chgData name="Sandro Assek" userId="c00f4fa3-2fb0-4ff2-817b-9b12cde38168" providerId="ADAL" clId="{879E222E-A6AC-41DC-AC0B-D5A2E8530FCD}" dt="2023-06-22T10:08:47.498" v="845" actId="20577"/>
+          <ac:spMkLst>
+            <pc:docMk/>
+            <pc:sldMk cId="0" sldId="261"/>
+            <ac:spMk id="3" creationId="{56EB18EA-23DD-83D7-C46F-87CF567AA9C5}"/>
+          </ac:spMkLst>
+        </pc:spChg>
+        <pc:spChg chg="add del mod">
+          <ac:chgData name="Sandro Assek" userId="c00f4fa3-2fb0-4ff2-817b-9b12cde38168" providerId="ADAL" clId="{879E222E-A6AC-41DC-AC0B-D5A2E8530FCD}" dt="2023-06-22T09:57:55.096" v="499"/>
+          <ac:spMkLst>
+            <pc:docMk/>
+            <pc:sldMk cId="0" sldId="261"/>
+            <ac:spMk id="6" creationId="{0ABC2269-5474-4543-9117-BE011B8DE079}"/>
+          </ac:spMkLst>
+        </pc:spChg>
+        <pc:spChg chg="add del mod">
+          <ac:chgData name="Sandro Assek" userId="c00f4fa3-2fb0-4ff2-817b-9b12cde38168" providerId="ADAL" clId="{879E222E-A6AC-41DC-AC0B-D5A2E8530FCD}" dt="2023-06-22T09:57:30.581" v="491"/>
+          <ac:spMkLst>
+            <pc:docMk/>
+            <pc:sldMk cId="0" sldId="261"/>
+            <ac:spMk id="7" creationId="{61DFA534-0997-45A5-91E8-E7DA0D8FC34F}"/>
+          </ac:spMkLst>
+        </pc:spChg>
+        <pc:spChg chg="add del mod">
+          <ac:chgData name="Sandro Assek" userId="c00f4fa3-2fb0-4ff2-817b-9b12cde38168" providerId="ADAL" clId="{879E222E-A6AC-41DC-AC0B-D5A2E8530FCD}" dt="2023-06-22T09:58:06.318" v="507"/>
+          <ac:spMkLst>
+            <pc:docMk/>
+            <pc:sldMk cId="0" sldId="261"/>
+            <ac:spMk id="8" creationId="{8E394262-71D2-4E21-A7B6-F601C885BDDF}"/>
+          </ac:spMkLst>
+        </pc:spChg>
+        <pc:picChg chg="add mod">
+          <ac:chgData name="Sandro Assek" userId="c00f4fa3-2fb0-4ff2-817b-9b12cde38168" providerId="ADAL" clId="{879E222E-A6AC-41DC-AC0B-D5A2E8530FCD}" dt="2023-06-22T10:00:44.345" v="540" actId="1076"/>
+          <ac:picMkLst>
+            <pc:docMk/>
+            <pc:sldMk cId="0" sldId="261"/>
+            <ac:picMk id="4" creationId="{7939D6C8-C7D4-45B8-BAA1-52C915844E54}"/>
+          </ac:picMkLst>
+        </pc:picChg>
+        <pc:picChg chg="add mod">
+          <ac:chgData name="Sandro Assek" userId="c00f4fa3-2fb0-4ff2-817b-9b12cde38168" providerId="ADAL" clId="{879E222E-A6AC-41DC-AC0B-D5A2E8530FCD}" dt="2023-06-22T10:00:42.339" v="539" actId="1076"/>
+          <ac:picMkLst>
+            <pc:docMk/>
+            <pc:sldMk cId="0" sldId="261"/>
+            <ac:picMk id="5" creationId="{58C3CA90-12AF-4E69-9A3A-3BE589835619}"/>
+          </ac:picMkLst>
+        </pc:picChg>
+      </pc:sldChg>
+    </pc:docChg>
+  </pc:docChgLst>
   <pc:docChgLst>
     <pc:chgData name="Wittner Christoph" userId="fc7457a2-a2ef-4f24-b8b5-f1361b29663d" providerId="ADAL" clId="{80847FDB-E8F1-463B-ADD5-88886BABD9D6}"/>
     <pc:docChg chg="undo custSel addSld delSld modSld sldOrd">
@@ -617,7 +681,7 @@
           <a:p>
             <a:pPr lvl="0"/>
             <a:fld id="{42BA9B41-DA04-4F58-AA74-4B9472D731E1}" type="slidenum">
-              <a:t>‹#›</a:t>
+              <a:t>‹Nr.›</a:t>
             </a:fld>
             <a:endParaRPr lang="de-DE"/>
           </a:p>
@@ -854,7 +918,7 @@
           <a:p>
             <a:pPr lvl="0"/>
             <a:fld id="{0239BA78-B16C-4AAC-A728-AEFC4703D0AD}" type="slidenum">
-              <a:t>‹#›</a:t>
+              <a:t>‹Nr.›</a:t>
             </a:fld>
             <a:endParaRPr lang="de-DE"/>
           </a:p>
@@ -1100,7 +1164,7 @@
           <a:p>
             <a:pPr lvl="0"/>
             <a:fld id="{0CD7FD27-A706-4453-B1B4-C9E5F3579808}" type="slidenum">
-              <a:t>‹#›</a:t>
+              <a:t>‹Nr.›</a:t>
             </a:fld>
             <a:endParaRPr lang="de-DE"/>
           </a:p>
@@ -1336,7 +1400,7 @@
           <a:p>
             <a:pPr lvl="0"/>
             <a:fld id="{1368AC57-4802-4BF3-803F-BD5FC90033A4}" type="slidenum">
-              <a:t>‹#›</a:t>
+              <a:t>‹Nr.›</a:t>
             </a:fld>
             <a:endParaRPr lang="de-DE"/>
           </a:p>
@@ -1547,7 +1611,7 @@
           <a:p>
             <a:pPr lvl="0"/>
             <a:fld id="{51F48843-55FE-4C4C-88D4-6BB9C8C8739F}" type="slidenum">
-              <a:t>‹#›</a:t>
+              <a:t>‹Nr.›</a:t>
             </a:fld>
             <a:endParaRPr lang="de-DE"/>
           </a:p>
@@ -1867,7 +1931,7 @@
           <a:p>
             <a:pPr lvl="0"/>
             <a:fld id="{B3B730D7-8C0C-41EF-A169-230F34CE8E1B}" type="slidenum">
-              <a:t>‹#›</a:t>
+              <a:t>‹Nr.›</a:t>
             </a:fld>
             <a:endParaRPr lang="de-DE"/>
           </a:p>
@@ -2270,7 +2334,7 @@
           <a:p>
             <a:pPr lvl="0"/>
             <a:fld id="{428E59DF-F9A7-45CE-8399-C79E79CD0A0A}" type="slidenum">
-              <a:t>‹#›</a:t>
+              <a:t>‹Nr.›</a:t>
             </a:fld>
             <a:endParaRPr lang="de-DE"/>
           </a:p>
@@ -2432,7 +2496,7 @@
           <a:p>
             <a:pPr lvl="0"/>
             <a:fld id="{32E3A4B9-CB0E-4BCE-965A-6882450B5A44}" type="slidenum">
-              <a:t>‹#›</a:t>
+              <a:t>‹Nr.›</a:t>
             </a:fld>
             <a:endParaRPr lang="de-DE"/>
           </a:p>
@@ -2560,7 +2624,7 @@
           <a:p>
             <a:pPr lvl="0"/>
             <a:fld id="{BBF9BF89-8DF7-462F-83A4-379B16AADBA8}" type="slidenum">
-              <a:t>‹#›</a:t>
+              <a:t>‹Nr.›</a:t>
             </a:fld>
             <a:endParaRPr lang="de-DE"/>
           </a:p>
@@ -2845,7 +2909,7 @@
           <a:p>
             <a:pPr lvl="0"/>
             <a:fld id="{559A422C-B82B-4A46-AF36-EC65498404E3}" type="slidenum">
-              <a:t>‹#›</a:t>
+              <a:t>‹Nr.›</a:t>
             </a:fld>
             <a:endParaRPr lang="de-DE"/>
           </a:p>
@@ -3087,7 +3151,7 @@
           <a:p>
             <a:pPr lvl="0"/>
             <a:fld id="{7C81FA7C-24F3-48DB-B8D8-D9C88B2EA174}" type="slidenum">
-              <a:t>‹#›</a:t>
+              <a:t>‹Nr.›</a:t>
             </a:fld>
             <a:endParaRPr lang="de-DE"/>
           </a:p>
@@ -3432,7 +3496,7 @@
           <a:p>
             <a:pPr lvl="0"/>
             <a:fld id="{874B1260-3206-49A4-AB81-18C63B89D944}" type="slidenum">
-              <a:t>‹#›</a:t>
+              <a:t>‹Nr.›</a:t>
             </a:fld>
             <a:endParaRPr lang="de-DE"/>
           </a:p>
@@ -4081,7 +4145,7 @@
           <a:p>
             <a:pPr lvl="0"/>
             <a:r>
-              <a:rPr lang="de-DE"/>
+              <a:rPr lang="de-DE" dirty="0"/>
               <a:t>SVM</a:t>
             </a:r>
           </a:p>
@@ -4103,15 +4167,143 @@
             <p:ph idx="1"/>
           </p:nvPr>
         </p:nvSpPr>
-        <p:spPr/>
+        <p:spPr>
+          <a:xfrm>
+            <a:off x="838203" y="1825627"/>
+            <a:ext cx="10839991" cy="4351336"/>
+          </a:xfrm>
+        </p:spPr>
         <p:txBody>
           <a:bodyPr/>
           <a:lstStyle/>
           <a:p>
-            <a:endParaRPr lang="de-DE"/>
-          </a:p>
-        </p:txBody>
-      </p:sp>
+            <a:r>
+              <a:rPr lang="en-GB" sz="2400" dirty="0" err="1"/>
+              <a:t>sklearns</a:t>
+            </a:r>
+            <a:r>
+              <a:rPr lang="en-GB" sz="2400" dirty="0"/>
+              <a:t> SVM settings from Task 3:</a:t>
+            </a:r>
+          </a:p>
+          <a:p>
+            <a:pPr lvl="1"/>
+            <a:r>
+              <a:rPr lang="en-GB" sz="1800" dirty="0">
+                <a:latin typeface="Consolas" panose="020B0609020204030204" pitchFamily="49" charset="0"/>
+              </a:rPr>
+              <a:t>[kernel=‘</a:t>
+            </a:r>
+            <a:r>
+              <a:rPr lang="en-GB" sz="1800" dirty="0" err="1">
+                <a:latin typeface="Consolas" panose="020B0609020204030204" pitchFamily="49" charset="0"/>
+              </a:rPr>
+              <a:t>rbf</a:t>
+            </a:r>
+            <a:r>
+              <a:rPr lang="en-GB" sz="1800" dirty="0">
+                <a:latin typeface="Consolas" panose="020B0609020204030204" pitchFamily="49" charset="0"/>
+              </a:rPr>
+              <a:t>‘, C=4, </a:t>
+            </a:r>
+            <a:r>
+              <a:rPr lang="en-GB" sz="1800" dirty="0" err="1">
+                <a:latin typeface="Consolas" panose="020B0609020204030204" pitchFamily="49" charset="0"/>
+              </a:rPr>
+              <a:t>tol</a:t>
+            </a:r>
+            <a:r>
+              <a:rPr lang="en-GB" sz="1800" dirty="0">
+                <a:latin typeface="Consolas" panose="020B0609020204030204" pitchFamily="49" charset="0"/>
+              </a:rPr>
+              <a:t>=1e-3, gamma=‘auto‘]</a:t>
+            </a:r>
+          </a:p>
+          <a:p>
+            <a:r>
+              <a:rPr lang="en-GB" sz="2000" dirty="0"/>
+              <a:t>Training on 50 features and bird calls according to sampling from Task 3, clearly (left Confusion Matrix) SVM has a hard time detecting any bird calls</a:t>
+            </a:r>
+          </a:p>
+          <a:p>
+            <a:r>
+              <a:rPr lang="en-US" sz="2000" dirty="0"/>
+              <a:t>Applying postprocessing on the raw prediction sequences of the test set increases the models’ (right Confusion Matrix) ability to detect bird calls and leads to an increase in approximated savings. </a:t>
+            </a:r>
+          </a:p>
+          <a:p>
+            <a:endParaRPr lang="en-GB" sz="2000" dirty="0"/>
+          </a:p>
+          <a:p>
+            <a:endParaRPr lang="en-GB" sz="2200" dirty="0">
+              <a:latin typeface="Consolas" panose="020B0609020204030204" pitchFamily="49" charset="0"/>
+            </a:endParaRPr>
+          </a:p>
+          <a:p>
+            <a:endParaRPr lang="en-GB" dirty="0"/>
+          </a:p>
+        </p:txBody>
+      </p:sp>
+      <p:pic>
+        <p:nvPicPr>
+          <p:cNvPr id="4" name="Grafik 3">
+            <a:extLst>
+              <a:ext uri="{FF2B5EF4-FFF2-40B4-BE49-F238E27FC236}">
+                <a16:creationId xmlns:a16="http://schemas.microsoft.com/office/drawing/2014/main" id="{7939D6C8-C7D4-45B8-BAA1-52C915844E54}"/>
+              </a:ext>
+            </a:extLst>
+          </p:cNvPr>
+          <p:cNvPicPr>
+            <a:picLocks noChangeAspect="1"/>
+          </p:cNvPicPr>
+          <p:nvPr/>
+        </p:nvPicPr>
+        <p:blipFill>
+          <a:blip r:embed="rId2"/>
+          <a:stretch>
+            <a:fillRect/>
+          </a:stretch>
+        </p:blipFill>
+        <p:spPr>
+          <a:xfrm>
+            <a:off x="2561521" y="3972871"/>
+            <a:ext cx="3121911" cy="2520000"/>
+          </a:xfrm>
+          <a:prstGeom prst="rect">
+            <a:avLst/>
+          </a:prstGeom>
+        </p:spPr>
+      </p:pic>
+      <p:pic>
+        <p:nvPicPr>
+          <p:cNvPr id="5" name="Grafik 4">
+            <a:extLst>
+              <a:ext uri="{FF2B5EF4-FFF2-40B4-BE49-F238E27FC236}">
+                <a16:creationId xmlns:a16="http://schemas.microsoft.com/office/drawing/2014/main" id="{58C3CA90-12AF-4E69-9A3A-3BE589835619}"/>
+              </a:ext>
+            </a:extLst>
+          </p:cNvPr>
+          <p:cNvPicPr>
+            <a:picLocks noChangeAspect="1"/>
+          </p:cNvPicPr>
+          <p:nvPr/>
+        </p:nvPicPr>
+        <p:blipFill>
+          <a:blip r:embed="rId3"/>
+          <a:stretch>
+            <a:fillRect/>
+          </a:stretch>
+        </p:blipFill>
+        <p:spPr>
+          <a:xfrm>
+            <a:off x="6763295" y="3972871"/>
+            <a:ext cx="3087000" cy="2520000"/>
+          </a:xfrm>
+          <a:prstGeom prst="rect">
+            <a:avLst/>
+          </a:prstGeom>
+        </p:spPr>
+      </p:pic>
     </p:spTree>
   </p:cSld>
   <p:clrMapOvr>
@@ -5506,9 +5698,38 @@
           <a:p>
             <a:pPr lvl="0"/>
             <a:r>
-              <a:rPr lang="de-DE"/>
-              <a:t>Top 50 Features chosen by mutual information gain</a:t>
-            </a:r>
+              <a:rPr lang="de-DE" dirty="0"/>
+              <a:t>Top 50 Features </a:t>
+            </a:r>
+            <a:r>
+              <a:rPr lang="de-DE" dirty="0" err="1"/>
+              <a:t>chosen</a:t>
+            </a:r>
+            <a:r>
+              <a:rPr lang="de-DE" dirty="0"/>
+              <a:t> </a:t>
+            </a:r>
+            <a:r>
+              <a:rPr lang="de-DE" dirty="0" err="1"/>
+              <a:t>by</a:t>
+            </a:r>
+            <a:r>
+              <a:rPr lang="de-DE" dirty="0"/>
+              <a:t> mutual </a:t>
+            </a:r>
+            <a:r>
+              <a:rPr lang="de-DE" dirty="0" err="1"/>
+              <a:t>information</a:t>
+            </a:r>
+            <a:r>
+              <a:rPr lang="de-DE" dirty="0"/>
+              <a:t> </a:t>
+            </a:r>
+            <a:r>
+              <a:rPr lang="de-DE" dirty="0" err="1"/>
+              <a:t>gain</a:t>
+            </a:r>
+            <a:endParaRPr lang="de-DE" dirty="0"/>
           </a:p>
         </p:txBody>
       </p:sp>

</xml_diff>